<commit_message>
Switch from loading assets to using pre-loaded
</commit_message>
<xml_diff>
--- a/Dataflow Diagram.pptx
+++ b/Dataflow Diagram.pptx
@@ -104,6 +104,11 @@
       </a:defRPr>
     </a:lvl9pPr>
   </p:defaultTextStyle>
+  <p:extLst>
+    <p:ext uri="{EFAFB233-063F-42B5-8137-9DF3F51BA10A}">
+      <p15:sldGuideLst xmlns:p15="http://schemas.microsoft.com/office/powerpoint/2012/main"/>
+    </p:ext>
+  </p:extLst>
 </p:presentation>
 </file>
 
@@ -254,7 +259,7 @@
           <a:p>
             <a:fld id="{5C71F36D-A0DF-40AB-8E02-6FDD2BE07F43}" type="datetimeFigureOut">
               <a:rPr lang="en-US" smtClean="0"/>
-              <a:t>02/26/24</a:t>
+              <a:t>05/03/24</a:t>
             </a:fld>
             <a:endParaRPr lang="en-US"/>
           </a:p>
@@ -452,7 +457,7 @@
           <a:p>
             <a:fld id="{5C71F36D-A0DF-40AB-8E02-6FDD2BE07F43}" type="datetimeFigureOut">
               <a:rPr lang="en-US" smtClean="0"/>
-              <a:t>02/26/24</a:t>
+              <a:t>05/03/24</a:t>
             </a:fld>
             <a:endParaRPr lang="en-US"/>
           </a:p>
@@ -660,7 +665,7 @@
           <a:p>
             <a:fld id="{5C71F36D-A0DF-40AB-8E02-6FDD2BE07F43}" type="datetimeFigureOut">
               <a:rPr lang="en-US" smtClean="0"/>
-              <a:t>02/26/24</a:t>
+              <a:t>05/03/24</a:t>
             </a:fld>
             <a:endParaRPr lang="en-US"/>
           </a:p>
@@ -858,7 +863,7 @@
           <a:p>
             <a:fld id="{5C71F36D-A0DF-40AB-8E02-6FDD2BE07F43}" type="datetimeFigureOut">
               <a:rPr lang="en-US" smtClean="0"/>
-              <a:t>02/26/24</a:t>
+              <a:t>05/03/24</a:t>
             </a:fld>
             <a:endParaRPr lang="en-US"/>
           </a:p>
@@ -1133,7 +1138,7 @@
           <a:p>
             <a:fld id="{5C71F36D-A0DF-40AB-8E02-6FDD2BE07F43}" type="datetimeFigureOut">
               <a:rPr lang="en-US" smtClean="0"/>
-              <a:t>02/26/24</a:t>
+              <a:t>05/03/24</a:t>
             </a:fld>
             <a:endParaRPr lang="en-US"/>
           </a:p>
@@ -1398,7 +1403,7 @@
           <a:p>
             <a:fld id="{5C71F36D-A0DF-40AB-8E02-6FDD2BE07F43}" type="datetimeFigureOut">
               <a:rPr lang="en-US" smtClean="0"/>
-              <a:t>02/26/24</a:t>
+              <a:t>05/03/24</a:t>
             </a:fld>
             <a:endParaRPr lang="en-US"/>
           </a:p>
@@ -1810,7 +1815,7 @@
           <a:p>
             <a:fld id="{5C71F36D-A0DF-40AB-8E02-6FDD2BE07F43}" type="datetimeFigureOut">
               <a:rPr lang="en-US" smtClean="0"/>
-              <a:t>02/26/24</a:t>
+              <a:t>05/03/24</a:t>
             </a:fld>
             <a:endParaRPr lang="en-US"/>
           </a:p>
@@ -1951,7 +1956,7 @@
           <a:p>
             <a:fld id="{5C71F36D-A0DF-40AB-8E02-6FDD2BE07F43}" type="datetimeFigureOut">
               <a:rPr lang="en-US" smtClean="0"/>
-              <a:t>02/26/24</a:t>
+              <a:t>05/03/24</a:t>
             </a:fld>
             <a:endParaRPr lang="en-US"/>
           </a:p>
@@ -2064,7 +2069,7 @@
           <a:p>
             <a:fld id="{5C71F36D-A0DF-40AB-8E02-6FDD2BE07F43}" type="datetimeFigureOut">
               <a:rPr lang="en-US" smtClean="0"/>
-              <a:t>02/26/24</a:t>
+              <a:t>05/03/24</a:t>
             </a:fld>
             <a:endParaRPr lang="en-US"/>
           </a:p>
@@ -2375,7 +2380,7 @@
           <a:p>
             <a:fld id="{5C71F36D-A0DF-40AB-8E02-6FDD2BE07F43}" type="datetimeFigureOut">
               <a:rPr lang="en-US" smtClean="0"/>
-              <a:t>02/26/24</a:t>
+              <a:t>05/03/24</a:t>
             </a:fld>
             <a:endParaRPr lang="en-US"/>
           </a:p>
@@ -2663,7 +2668,7 @@
           <a:p>
             <a:fld id="{5C71F36D-A0DF-40AB-8E02-6FDD2BE07F43}" type="datetimeFigureOut">
               <a:rPr lang="en-US" smtClean="0"/>
-              <a:t>02/26/24</a:t>
+              <a:t>05/03/24</a:t>
             </a:fld>
             <a:endParaRPr lang="en-US"/>
           </a:p>
@@ -2904,7 +2909,7 @@
           <a:p>
             <a:fld id="{5C71F36D-A0DF-40AB-8E02-6FDD2BE07F43}" type="datetimeFigureOut">
               <a:rPr lang="en-US" smtClean="0"/>
-              <a:t>02/26/24</a:t>
+              <a:t>05/03/24</a:t>
             </a:fld>
             <a:endParaRPr lang="en-US"/>
           </a:p>
@@ -3335,7 +3340,7 @@
         </p:nvSpPr>
         <p:spPr>
           <a:xfrm>
-            <a:off x="8718894" y="4668827"/>
+            <a:off x="8253648" y="4672962"/>
             <a:ext cx="1926454" cy="701336"/>
           </a:xfrm>
           <a:prstGeom prst="rect">
@@ -3384,7 +3389,7 @@
         </p:nvSpPr>
         <p:spPr>
           <a:xfrm>
-            <a:off x="4962160" y="2727664"/>
+            <a:off x="4841844" y="1428258"/>
             <a:ext cx="1926454" cy="701336"/>
           </a:xfrm>
           <a:prstGeom prst="rect">
@@ -3440,7 +3445,7 @@
         </p:nvSpPr>
         <p:spPr>
           <a:xfrm>
-            <a:off x="4919710" y="4668827"/>
+            <a:off x="5222912" y="3882969"/>
             <a:ext cx="1926454" cy="701336"/>
           </a:xfrm>
           <a:prstGeom prst="rect">
@@ -3489,7 +3494,449 @@
         </p:nvSpPr>
         <p:spPr>
           <a:xfrm>
-            <a:off x="850979" y="3612047"/>
+            <a:off x="730663" y="2312641"/>
+            <a:ext cx="1926454" cy="701336"/>
+          </a:xfrm>
+          <a:prstGeom prst="rect">
+            <a:avLst/>
+          </a:prstGeom>
+          <a:solidFill>
+            <a:schemeClr val="bg2">
+              <a:lumMod val="75000"/>
+            </a:schemeClr>
+          </a:solidFill>
+        </p:spPr>
+        <p:style>
+          <a:lnRef idx="2">
+            <a:schemeClr val="accent1">
+              <a:shade val="15000"/>
+            </a:schemeClr>
+          </a:lnRef>
+          <a:fillRef idx="1">
+            <a:schemeClr val="accent1"/>
+          </a:fillRef>
+          <a:effectRef idx="0">
+            <a:schemeClr val="accent1"/>
+          </a:effectRef>
+          <a:fontRef idx="minor">
+            <a:schemeClr val="lt1"/>
+          </a:fontRef>
+        </p:style>
+        <p:txBody>
+          <a:bodyPr rtlCol="0" anchor="ctr"/>
+          <a:lstStyle/>
+          <a:p>
+            <a:pPr algn="ctr"/>
+            <a:r>
+              <a:rPr lang="en-US" dirty="0"/>
+              <a:t>CMU Dataset</a:t>
+            </a:r>
+          </a:p>
+        </p:txBody>
+      </p:sp>
+      <p:sp>
+        <p:nvSpPr>
+          <p:cNvPr id="6" name="Arrow: Right 5">
+            <a:extLst>
+              <a:ext uri="{FF2B5EF4-FFF2-40B4-BE49-F238E27FC236}">
+                <a16:creationId xmlns:a16="http://schemas.microsoft.com/office/drawing/2014/main" id="{25FB69E8-942F-6F52-AE43-189EE0F35114}"/>
+              </a:ext>
+            </a:extLst>
+          </p:cNvPr>
+          <p:cNvSpPr/>
+          <p:nvPr/>
+        </p:nvSpPr>
+        <p:spPr>
+          <a:xfrm>
+            <a:off x="3130734" y="3833164"/>
+            <a:ext cx="2262192" cy="792339"/>
+          </a:xfrm>
+          <a:prstGeom prst="rightArrow">
+            <a:avLst/>
+          </a:prstGeom>
+          <a:solidFill>
+            <a:schemeClr val="bg2">
+              <a:lumMod val="75000"/>
+            </a:schemeClr>
+          </a:solidFill>
+        </p:spPr>
+        <p:style>
+          <a:lnRef idx="2">
+            <a:schemeClr val="accent6">
+              <a:shade val="15000"/>
+            </a:schemeClr>
+          </a:lnRef>
+          <a:fillRef idx="1">
+            <a:schemeClr val="accent6"/>
+          </a:fillRef>
+          <a:effectRef idx="0">
+            <a:schemeClr val="accent6"/>
+          </a:effectRef>
+          <a:fontRef idx="minor">
+            <a:schemeClr val="lt1"/>
+          </a:fontRef>
+        </p:style>
+        <p:txBody>
+          <a:bodyPr rtlCol="0" anchor="ctr"/>
+          <a:lstStyle/>
+          <a:p>
+            <a:pPr algn="ctr"/>
+            <a:r>
+              <a:rPr lang="en-US" dirty="0"/>
+              <a:t>Train Model</a:t>
+            </a:r>
+          </a:p>
+        </p:txBody>
+      </p:sp>
+      <p:sp>
+        <p:nvSpPr>
+          <p:cNvPr id="11" name="Arrow: Right 10">
+            <a:extLst>
+              <a:ext uri="{FF2B5EF4-FFF2-40B4-BE49-F238E27FC236}">
+                <a16:creationId xmlns:a16="http://schemas.microsoft.com/office/drawing/2014/main" id="{B6CACDDD-883C-7D98-116E-FB42EE9AF02C}"/>
+              </a:ext>
+            </a:extLst>
+          </p:cNvPr>
+          <p:cNvSpPr/>
+          <p:nvPr/>
+        </p:nvSpPr>
+        <p:spPr>
+          <a:xfrm rot="2687694">
+            <a:off x="1656003" y="3225329"/>
+            <a:ext cx="1921894" cy="792339"/>
+          </a:xfrm>
+          <a:prstGeom prst="rightArrow">
+            <a:avLst/>
+          </a:prstGeom>
+          <a:solidFill>
+            <a:schemeClr val="bg2">
+              <a:lumMod val="75000"/>
+            </a:schemeClr>
+          </a:solidFill>
+        </p:spPr>
+        <p:style>
+          <a:lnRef idx="2">
+            <a:schemeClr val="accent6">
+              <a:shade val="15000"/>
+            </a:schemeClr>
+          </a:lnRef>
+          <a:fillRef idx="1">
+            <a:schemeClr val="accent6"/>
+          </a:fillRef>
+          <a:effectRef idx="0">
+            <a:schemeClr val="accent6"/>
+          </a:effectRef>
+          <a:fontRef idx="minor">
+            <a:schemeClr val="lt1"/>
+          </a:fontRef>
+        </p:style>
+        <p:txBody>
+          <a:bodyPr rtlCol="0" anchor="ctr"/>
+          <a:lstStyle/>
+          <a:p>
+            <a:pPr algn="ctr"/>
+            <a:r>
+              <a:rPr lang="en-US" dirty="0"/>
+              <a:t>Preprocess Data</a:t>
+            </a:r>
+          </a:p>
+        </p:txBody>
+      </p:sp>
+      <p:sp>
+        <p:nvSpPr>
+          <p:cNvPr id="13" name="Arrow: Right 12">
+            <a:extLst>
+              <a:ext uri="{FF2B5EF4-FFF2-40B4-BE49-F238E27FC236}">
+                <a16:creationId xmlns:a16="http://schemas.microsoft.com/office/drawing/2014/main" id="{DCC8D91F-98CF-763F-81E1-5E8E1D7FA970}"/>
+              </a:ext>
+            </a:extLst>
+          </p:cNvPr>
+          <p:cNvSpPr/>
+          <p:nvPr/>
+        </p:nvSpPr>
+        <p:spPr>
+          <a:xfrm rot="1431248">
+            <a:off x="6547859" y="4440070"/>
+            <a:ext cx="1901360" cy="792339"/>
+          </a:xfrm>
+          <a:prstGeom prst="rightArrow">
+            <a:avLst/>
+          </a:prstGeom>
+        </p:spPr>
+        <p:style>
+          <a:lnRef idx="2">
+            <a:schemeClr val="accent6">
+              <a:shade val="15000"/>
+            </a:schemeClr>
+          </a:lnRef>
+          <a:fillRef idx="1">
+            <a:schemeClr val="accent6"/>
+          </a:fillRef>
+          <a:effectRef idx="0">
+            <a:schemeClr val="accent6"/>
+          </a:effectRef>
+          <a:fontRef idx="minor">
+            <a:schemeClr val="lt1"/>
+          </a:fontRef>
+        </p:style>
+        <p:txBody>
+          <a:bodyPr rtlCol="0" anchor="ctr"/>
+          <a:lstStyle/>
+          <a:p>
+            <a:pPr algn="ctr"/>
+            <a:r>
+              <a:rPr lang="en-US" dirty="0"/>
+              <a:t>Detect Emotion</a:t>
+            </a:r>
+          </a:p>
+        </p:txBody>
+      </p:sp>
+      <p:sp>
+        <p:nvSpPr>
+          <p:cNvPr id="15" name="Rectangle 14">
+            <a:extLst>
+              <a:ext uri="{FF2B5EF4-FFF2-40B4-BE49-F238E27FC236}">
+                <a16:creationId xmlns:a16="http://schemas.microsoft.com/office/drawing/2014/main" id="{32AFDC28-0673-B935-8302-6DB7E5B9DDB3}"/>
+              </a:ext>
+            </a:extLst>
+          </p:cNvPr>
+          <p:cNvSpPr/>
+          <p:nvPr/>
+        </p:nvSpPr>
+        <p:spPr>
+          <a:xfrm>
+            <a:off x="8681277" y="960410"/>
+            <a:ext cx="2626768" cy="1221507"/>
+          </a:xfrm>
+          <a:prstGeom prst="rect">
+            <a:avLst/>
+          </a:prstGeom>
+        </p:spPr>
+        <p:style>
+          <a:lnRef idx="2">
+            <a:schemeClr val="accent1">
+              <a:shade val="15000"/>
+            </a:schemeClr>
+          </a:lnRef>
+          <a:fillRef idx="1">
+            <a:schemeClr val="accent1"/>
+          </a:fillRef>
+          <a:effectRef idx="0">
+            <a:schemeClr val="accent1"/>
+          </a:effectRef>
+          <a:fontRef idx="minor">
+            <a:schemeClr val="lt1"/>
+          </a:fontRef>
+        </p:style>
+        <p:txBody>
+          <a:bodyPr rtlCol="0" anchor="ctr"/>
+          <a:lstStyle/>
+          <a:p>
+            <a:pPr algn="ctr"/>
+            <a:r>
+              <a:rPr lang="en-US" dirty="0"/>
+              <a:t>User</a:t>
+            </a:r>
+          </a:p>
+        </p:txBody>
+      </p:sp>
+      <p:sp>
+        <p:nvSpPr>
+          <p:cNvPr id="16" name="Arrow: Right 15">
+            <a:extLst>
+              <a:ext uri="{FF2B5EF4-FFF2-40B4-BE49-F238E27FC236}">
+                <a16:creationId xmlns:a16="http://schemas.microsoft.com/office/drawing/2014/main" id="{2E5CE333-C31E-E675-AA2B-4811A2B93098}"/>
+              </a:ext>
+            </a:extLst>
+          </p:cNvPr>
+          <p:cNvSpPr/>
+          <p:nvPr/>
+        </p:nvSpPr>
+        <p:spPr>
+          <a:xfrm rot="20917431" flipH="1">
+            <a:off x="6496867" y="990515"/>
+            <a:ext cx="2388504" cy="1097339"/>
+          </a:xfrm>
+          <a:prstGeom prst="rightArrow">
+            <a:avLst/>
+          </a:prstGeom>
+          <a:solidFill>
+            <a:schemeClr val="bg2">
+              <a:lumMod val="75000"/>
+            </a:schemeClr>
+          </a:solidFill>
+        </p:spPr>
+        <p:style>
+          <a:lnRef idx="2">
+            <a:schemeClr val="accent6">
+              <a:shade val="15000"/>
+            </a:schemeClr>
+          </a:lnRef>
+          <a:fillRef idx="1">
+            <a:schemeClr val="accent6"/>
+          </a:fillRef>
+          <a:effectRef idx="0">
+            <a:schemeClr val="accent6"/>
+          </a:effectRef>
+          <a:fontRef idx="minor">
+            <a:schemeClr val="lt1"/>
+          </a:fontRef>
+        </p:style>
+        <p:txBody>
+          <a:bodyPr rtlCol="0" anchor="ctr"/>
+          <a:lstStyle/>
+          <a:p>
+            <a:pPr algn="ctr"/>
+            <a:r>
+              <a:rPr lang="en-US" dirty="0"/>
+              <a:t>Provide Information</a:t>
+            </a:r>
+          </a:p>
+          <a:p>
+            <a:pPr algn="ctr"/>
+            <a:r>
+              <a:rPr lang="en-US" dirty="0"/>
+              <a:t>(Current Task, </a:t>
+            </a:r>
+            <a:r>
+              <a:rPr lang="en-US" dirty="0" err="1"/>
+              <a:t>etc</a:t>
+            </a:r>
+            <a:r>
+              <a:rPr lang="en-US" dirty="0"/>
+              <a:t>)</a:t>
+            </a:r>
+          </a:p>
+        </p:txBody>
+      </p:sp>
+      <p:sp>
+        <p:nvSpPr>
+          <p:cNvPr id="18" name="Arrow: Right 17">
+            <a:extLst>
+              <a:ext uri="{FF2B5EF4-FFF2-40B4-BE49-F238E27FC236}">
+                <a16:creationId xmlns:a16="http://schemas.microsoft.com/office/drawing/2014/main" id="{57AC7A33-E585-F6A7-2BE5-300AD20DBE69}"/>
+              </a:ext>
+            </a:extLst>
+          </p:cNvPr>
+          <p:cNvSpPr/>
+          <p:nvPr/>
+        </p:nvSpPr>
+        <p:spPr>
+          <a:xfrm rot="17311316">
+            <a:off x="8181198" y="2814112"/>
+            <a:ext cx="2865147" cy="1097339"/>
+          </a:xfrm>
+          <a:prstGeom prst="rightArrow">
+            <a:avLst/>
+          </a:prstGeom>
+        </p:spPr>
+        <p:style>
+          <a:lnRef idx="2">
+            <a:schemeClr val="accent6">
+              <a:shade val="15000"/>
+            </a:schemeClr>
+          </a:lnRef>
+          <a:fillRef idx="1">
+            <a:schemeClr val="accent6"/>
+          </a:fillRef>
+          <a:effectRef idx="0">
+            <a:schemeClr val="accent6"/>
+          </a:effectRef>
+          <a:fontRef idx="minor">
+            <a:schemeClr val="lt1"/>
+          </a:fontRef>
+        </p:style>
+        <p:txBody>
+          <a:bodyPr rtlCol="0" anchor="ctr"/>
+          <a:lstStyle/>
+          <a:p>
+            <a:pPr algn="ctr"/>
+            <a:r>
+              <a:rPr lang="en-US" dirty="0"/>
+              <a:t>Assist User in Focusing</a:t>
+            </a:r>
+          </a:p>
+          <a:p>
+            <a:pPr algn="ctr"/>
+            <a:r>
+              <a:rPr lang="en-US" dirty="0"/>
+              <a:t>(Break </a:t>
+            </a:r>
+            <a:r>
+              <a:rPr lang="en-US" dirty="0" err="1"/>
+              <a:t>Notif</a:t>
+            </a:r>
+            <a:r>
+              <a:rPr lang="en-US" dirty="0"/>
+              <a:t>, Music)</a:t>
+            </a:r>
+          </a:p>
+        </p:txBody>
+      </p:sp>
+      <p:sp>
+        <p:nvSpPr>
+          <p:cNvPr id="19" name="Arrow: Right 18">
+            <a:extLst>
+              <a:ext uri="{FF2B5EF4-FFF2-40B4-BE49-F238E27FC236}">
+                <a16:creationId xmlns:a16="http://schemas.microsoft.com/office/drawing/2014/main" id="{C0CF78F3-7E25-F2F5-06CD-5BCDB0594247}"/>
+              </a:ext>
+            </a:extLst>
+          </p:cNvPr>
+          <p:cNvSpPr/>
+          <p:nvPr/>
+        </p:nvSpPr>
+        <p:spPr>
+          <a:xfrm rot="3237680" flipH="1">
+            <a:off x="5858452" y="3018257"/>
+            <a:ext cx="3372850" cy="792339"/>
+          </a:xfrm>
+          <a:prstGeom prst="rightArrow">
+            <a:avLst/>
+          </a:prstGeom>
+        </p:spPr>
+        <p:style>
+          <a:lnRef idx="2">
+            <a:schemeClr val="accent6">
+              <a:shade val="15000"/>
+            </a:schemeClr>
+          </a:lnRef>
+          <a:fillRef idx="1">
+            <a:schemeClr val="accent6"/>
+          </a:fillRef>
+          <a:effectRef idx="0">
+            <a:schemeClr val="accent6"/>
+          </a:effectRef>
+          <a:fontRef idx="minor">
+            <a:schemeClr val="lt1"/>
+          </a:fontRef>
+        </p:style>
+        <p:txBody>
+          <a:bodyPr rtlCol="0" anchor="ctr"/>
+          <a:lstStyle/>
+          <a:p>
+            <a:pPr algn="ctr"/>
+            <a:r>
+              <a:rPr lang="en-US" dirty="0"/>
+              <a:t>Report Emotion on GUI</a:t>
+            </a:r>
+          </a:p>
+        </p:txBody>
+      </p:sp>
+      <p:sp>
+        <p:nvSpPr>
+          <p:cNvPr id="2" name="Rectangle 1">
+            <a:extLst>
+              <a:ext uri="{FF2B5EF4-FFF2-40B4-BE49-F238E27FC236}">
+                <a16:creationId xmlns:a16="http://schemas.microsoft.com/office/drawing/2014/main" id="{5FE126DE-DC09-39DB-EA25-3E5A9632F77F}"/>
+              </a:ext>
+            </a:extLst>
+          </p:cNvPr>
+          <p:cNvSpPr/>
+          <p:nvPr/>
+        </p:nvSpPr>
+        <p:spPr>
+          <a:xfrm>
+            <a:off x="1939600" y="5054724"/>
             <a:ext cx="1926454" cy="701336"/>
           </a:xfrm>
           <a:prstGeom prst="rect">
@@ -3518,18 +3965,22 @@
           <a:p>
             <a:pPr algn="ctr"/>
             <a:r>
+              <a:rPr lang="en-US" dirty="0" err="1"/>
+              <a:t>DeepFace</a:t>
+            </a:r>
+            <a:r>
               <a:rPr lang="en-US" dirty="0"/>
-              <a:t>CMU Dataset</a:t>
-            </a:r>
-          </a:p>
-        </p:txBody>
-      </p:sp>
-      <p:sp>
-        <p:nvSpPr>
-          <p:cNvPr id="6" name="Arrow: Right 5">
-            <a:extLst>
-              <a:ext uri="{FF2B5EF4-FFF2-40B4-BE49-F238E27FC236}">
-                <a16:creationId xmlns:a16="http://schemas.microsoft.com/office/drawing/2014/main" id="{25FB69E8-942F-6F52-AE43-189EE0F35114}"/>
+              <a:t> Library</a:t>
+            </a:r>
+          </a:p>
+        </p:txBody>
+      </p:sp>
+      <p:sp>
+        <p:nvSpPr>
+          <p:cNvPr id="3" name="Arrow: Right 2">
+            <a:extLst>
+              <a:ext uri="{FF2B5EF4-FFF2-40B4-BE49-F238E27FC236}">
+                <a16:creationId xmlns:a16="http://schemas.microsoft.com/office/drawing/2014/main" id="{33DB5BEB-25B2-0B9B-B49C-C5C0BE03BE82}"/>
               </a:ext>
             </a:extLst>
           </p:cNvPr>
@@ -3537,9 +3988,9 @@
           <p:nvPr/>
         </p:nvSpPr>
         <p:spPr>
-          <a:xfrm rot="20888405">
-            <a:off x="3130816" y="5101709"/>
-            <a:ext cx="2098409" cy="792339"/>
+          <a:xfrm rot="19978924">
+            <a:off x="3535042" y="4405648"/>
+            <a:ext cx="2099708" cy="792339"/>
           </a:xfrm>
           <a:prstGeom prst="rightArrow">
             <a:avLst/>
@@ -3568,7 +4019,7 @@
             <a:pPr algn="ctr"/>
             <a:r>
               <a:rPr lang="en-US" dirty="0"/>
-              <a:t>Train Model</a:t>
+              <a:t>Download Model</a:t>
             </a:r>
           </a:p>
         </p:txBody>
@@ -3587,8 +4038,8 @@
         </p:nvSpPr>
         <p:spPr>
           <a:xfrm rot="1561250">
-            <a:off x="2963500" y="4157698"/>
-            <a:ext cx="2098409" cy="792339"/>
+            <a:off x="3199224" y="3012219"/>
+            <a:ext cx="2458751" cy="792339"/>
           </a:xfrm>
           <a:prstGeom prst="rightArrow">
             <a:avLst/>
@@ -3617,7 +4068,7 @@
             <a:pPr algn="ctr"/>
             <a:r>
               <a:rPr lang="en-US" dirty="0"/>
-              <a:t>Inference Model</a:t>
+              <a:t>     Inference Model</a:t>
             </a:r>
           </a:p>
         </p:txBody>
@@ -3635,8 +4086,8 @@
           <p:nvPr/>
         </p:nvSpPr>
         <p:spPr>
-          <a:xfrm rot="20000642" flipH="1">
-            <a:off x="2981373" y="3113768"/>
+          <a:xfrm rot="19575074" flipH="1">
+            <a:off x="3009900" y="1929450"/>
             <a:ext cx="2361949" cy="792339"/>
           </a:xfrm>
           <a:prstGeom prst="rightArrow">
@@ -3667,330 +4118,6 @@
             <a:r>
               <a:rPr lang="en-US" dirty="0"/>
               <a:t>Record Camera Input</a:t>
-            </a:r>
-          </a:p>
-        </p:txBody>
-      </p:sp>
-      <p:sp>
-        <p:nvSpPr>
-          <p:cNvPr id="11" name="Arrow: Right 10">
-            <a:extLst>
-              <a:ext uri="{FF2B5EF4-FFF2-40B4-BE49-F238E27FC236}">
-                <a16:creationId xmlns:a16="http://schemas.microsoft.com/office/drawing/2014/main" id="{B6CACDDD-883C-7D98-116E-FB42EE9AF02C}"/>
-              </a:ext>
-            </a:extLst>
-          </p:cNvPr>
-          <p:cNvSpPr/>
-          <p:nvPr/>
-        </p:nvSpPr>
-        <p:spPr>
-          <a:xfrm rot="2687694">
-            <a:off x="1570216" y="4586919"/>
-            <a:ext cx="2098409" cy="792339"/>
-          </a:xfrm>
-          <a:prstGeom prst="rightArrow">
-            <a:avLst/>
-          </a:prstGeom>
-        </p:spPr>
-        <p:style>
-          <a:lnRef idx="2">
-            <a:schemeClr val="accent6">
-              <a:shade val="15000"/>
-            </a:schemeClr>
-          </a:lnRef>
-          <a:fillRef idx="1">
-            <a:schemeClr val="accent6"/>
-          </a:fillRef>
-          <a:effectRef idx="0">
-            <a:schemeClr val="accent6"/>
-          </a:effectRef>
-          <a:fontRef idx="minor">
-            <a:schemeClr val="lt1"/>
-          </a:fontRef>
-        </p:style>
-        <p:txBody>
-          <a:bodyPr rtlCol="0" anchor="ctr"/>
-          <a:lstStyle/>
-          <a:p>
-            <a:pPr algn="ctr"/>
-            <a:r>
-              <a:rPr lang="en-US" dirty="0"/>
-              <a:t>Preprocess Data</a:t>
-            </a:r>
-          </a:p>
-        </p:txBody>
-      </p:sp>
-      <p:sp>
-        <p:nvSpPr>
-          <p:cNvPr id="13" name="Arrow: Right 12">
-            <a:extLst>
-              <a:ext uri="{FF2B5EF4-FFF2-40B4-BE49-F238E27FC236}">
-                <a16:creationId xmlns:a16="http://schemas.microsoft.com/office/drawing/2014/main" id="{DCC8D91F-98CF-763F-81E1-5E8E1D7FA970}"/>
-              </a:ext>
-            </a:extLst>
-          </p:cNvPr>
-          <p:cNvSpPr/>
-          <p:nvPr/>
-        </p:nvSpPr>
-        <p:spPr>
-          <a:xfrm>
-            <a:off x="6771411" y="4668827"/>
-            <a:ext cx="2098409" cy="792339"/>
-          </a:xfrm>
-          <a:prstGeom prst="rightArrow">
-            <a:avLst/>
-          </a:prstGeom>
-        </p:spPr>
-        <p:style>
-          <a:lnRef idx="2">
-            <a:schemeClr val="accent6">
-              <a:shade val="15000"/>
-            </a:schemeClr>
-          </a:lnRef>
-          <a:fillRef idx="1">
-            <a:schemeClr val="accent6"/>
-          </a:fillRef>
-          <a:effectRef idx="0">
-            <a:schemeClr val="accent6"/>
-          </a:effectRef>
-          <a:fontRef idx="minor">
-            <a:schemeClr val="lt1"/>
-          </a:fontRef>
-        </p:style>
-        <p:txBody>
-          <a:bodyPr rtlCol="0" anchor="ctr"/>
-          <a:lstStyle/>
-          <a:p>
-            <a:pPr algn="ctr"/>
-            <a:r>
-              <a:rPr lang="en-US" dirty="0"/>
-              <a:t>Detect Emotion</a:t>
-            </a:r>
-          </a:p>
-        </p:txBody>
-      </p:sp>
-      <p:sp>
-        <p:nvSpPr>
-          <p:cNvPr id="15" name="Rectangle 14">
-            <a:extLst>
-              <a:ext uri="{FF2B5EF4-FFF2-40B4-BE49-F238E27FC236}">
-                <a16:creationId xmlns:a16="http://schemas.microsoft.com/office/drawing/2014/main" id="{32AFDC28-0673-B935-8302-6DB7E5B9DDB3}"/>
-              </a:ext>
-            </a:extLst>
-          </p:cNvPr>
-          <p:cNvSpPr/>
-          <p:nvPr/>
-        </p:nvSpPr>
-        <p:spPr>
-          <a:xfrm>
-            <a:off x="8581558" y="580075"/>
-            <a:ext cx="2626768" cy="1221507"/>
-          </a:xfrm>
-          <a:prstGeom prst="rect">
-            <a:avLst/>
-          </a:prstGeom>
-        </p:spPr>
-        <p:style>
-          <a:lnRef idx="2">
-            <a:schemeClr val="accent1">
-              <a:shade val="15000"/>
-            </a:schemeClr>
-          </a:lnRef>
-          <a:fillRef idx="1">
-            <a:schemeClr val="accent1"/>
-          </a:fillRef>
-          <a:effectRef idx="0">
-            <a:schemeClr val="accent1"/>
-          </a:effectRef>
-          <a:fontRef idx="minor">
-            <a:schemeClr val="lt1"/>
-          </a:fontRef>
-        </p:style>
-        <p:txBody>
-          <a:bodyPr rtlCol="0" anchor="ctr"/>
-          <a:lstStyle/>
-          <a:p>
-            <a:pPr algn="ctr"/>
-            <a:r>
-              <a:rPr lang="en-US" dirty="0"/>
-              <a:t>User</a:t>
-            </a:r>
-          </a:p>
-        </p:txBody>
-      </p:sp>
-      <p:sp>
-        <p:nvSpPr>
-          <p:cNvPr id="16" name="Arrow: Right 15">
-            <a:extLst>
-              <a:ext uri="{FF2B5EF4-FFF2-40B4-BE49-F238E27FC236}">
-                <a16:creationId xmlns:a16="http://schemas.microsoft.com/office/drawing/2014/main" id="{2E5CE333-C31E-E675-AA2B-4811A2B93098}"/>
-              </a:ext>
-            </a:extLst>
-          </p:cNvPr>
-          <p:cNvSpPr/>
-          <p:nvPr/>
-        </p:nvSpPr>
-        <p:spPr>
-          <a:xfrm rot="19390718" flipH="1">
-            <a:off x="5961565" y="1252913"/>
-            <a:ext cx="2933972" cy="1097339"/>
-          </a:xfrm>
-          <a:prstGeom prst="rightArrow">
-            <a:avLst/>
-          </a:prstGeom>
-        </p:spPr>
-        <p:style>
-          <a:lnRef idx="2">
-            <a:schemeClr val="accent6">
-              <a:shade val="15000"/>
-            </a:schemeClr>
-          </a:lnRef>
-          <a:fillRef idx="1">
-            <a:schemeClr val="accent6"/>
-          </a:fillRef>
-          <a:effectRef idx="0">
-            <a:schemeClr val="accent6"/>
-          </a:effectRef>
-          <a:fontRef idx="minor">
-            <a:schemeClr val="lt1"/>
-          </a:fontRef>
-        </p:style>
-        <p:txBody>
-          <a:bodyPr rtlCol="0" anchor="ctr"/>
-          <a:lstStyle/>
-          <a:p>
-            <a:pPr algn="ctr"/>
-            <a:r>
-              <a:rPr lang="en-US" dirty="0"/>
-              <a:t>Provide Information</a:t>
-            </a:r>
-          </a:p>
-          <a:p>
-            <a:pPr algn="ctr"/>
-            <a:r>
-              <a:rPr lang="en-US" dirty="0"/>
-              <a:t>(Current Task, </a:t>
-            </a:r>
-            <a:r>
-              <a:rPr lang="en-US" dirty="0" err="1"/>
-              <a:t>etc</a:t>
-            </a:r>
-            <a:r>
-              <a:rPr lang="en-US" dirty="0"/>
-              <a:t>)</a:t>
-            </a:r>
-          </a:p>
-        </p:txBody>
-      </p:sp>
-      <p:sp>
-        <p:nvSpPr>
-          <p:cNvPr id="18" name="Arrow: Right 17">
-            <a:extLst>
-              <a:ext uri="{FF2B5EF4-FFF2-40B4-BE49-F238E27FC236}">
-                <a16:creationId xmlns:a16="http://schemas.microsoft.com/office/drawing/2014/main" id="{57AC7A33-E585-F6A7-2BE5-300AD20DBE69}"/>
-              </a:ext>
-            </a:extLst>
-          </p:cNvPr>
-          <p:cNvSpPr/>
-          <p:nvPr/>
-        </p:nvSpPr>
-        <p:spPr>
-          <a:xfrm rot="16447434">
-            <a:off x="8162233" y="2704279"/>
-            <a:ext cx="3328892" cy="1097339"/>
-          </a:xfrm>
-          <a:prstGeom prst="rightArrow">
-            <a:avLst/>
-          </a:prstGeom>
-        </p:spPr>
-        <p:style>
-          <a:lnRef idx="2">
-            <a:schemeClr val="accent6">
-              <a:shade val="15000"/>
-            </a:schemeClr>
-          </a:lnRef>
-          <a:fillRef idx="1">
-            <a:schemeClr val="accent6"/>
-          </a:fillRef>
-          <a:effectRef idx="0">
-            <a:schemeClr val="accent6"/>
-          </a:effectRef>
-          <a:fontRef idx="minor">
-            <a:schemeClr val="lt1"/>
-          </a:fontRef>
-        </p:style>
-        <p:txBody>
-          <a:bodyPr rtlCol="0" anchor="ctr"/>
-          <a:lstStyle/>
-          <a:p>
-            <a:pPr algn="ctr"/>
-            <a:r>
-              <a:rPr lang="en-US" dirty="0"/>
-              <a:t>Assist User in Focusing</a:t>
-            </a:r>
-          </a:p>
-          <a:p>
-            <a:pPr algn="ctr"/>
-            <a:r>
-              <a:rPr lang="en-US" dirty="0"/>
-              <a:t>(Break </a:t>
-            </a:r>
-            <a:r>
-              <a:rPr lang="en-US" dirty="0" err="1"/>
-              <a:t>Notif</a:t>
-            </a:r>
-            <a:r>
-              <a:rPr lang="en-US" dirty="0"/>
-              <a:t>, Music)</a:t>
-            </a:r>
-          </a:p>
-        </p:txBody>
-      </p:sp>
-      <p:sp>
-        <p:nvSpPr>
-          <p:cNvPr id="19" name="Arrow: Right 18">
-            <a:extLst>
-              <a:ext uri="{FF2B5EF4-FFF2-40B4-BE49-F238E27FC236}">
-                <a16:creationId xmlns:a16="http://schemas.microsoft.com/office/drawing/2014/main" id="{C0CF78F3-7E25-F2F5-06CD-5BCDB0594247}"/>
-              </a:ext>
-            </a:extLst>
-          </p:cNvPr>
-          <p:cNvSpPr/>
-          <p:nvPr/>
-        </p:nvSpPr>
-        <p:spPr>
-          <a:xfrm rot="1819091" flipH="1">
-            <a:off x="6387687" y="3617689"/>
-            <a:ext cx="2796895" cy="792339"/>
-          </a:xfrm>
-          <a:prstGeom prst="rightArrow">
-            <a:avLst/>
-          </a:prstGeom>
-        </p:spPr>
-        <p:style>
-          <a:lnRef idx="2">
-            <a:schemeClr val="accent6">
-              <a:shade val="15000"/>
-            </a:schemeClr>
-          </a:lnRef>
-          <a:fillRef idx="1">
-            <a:schemeClr val="accent6"/>
-          </a:fillRef>
-          <a:effectRef idx="0">
-            <a:schemeClr val="accent6"/>
-          </a:effectRef>
-          <a:fontRef idx="minor">
-            <a:schemeClr val="lt1"/>
-          </a:fontRef>
-        </p:style>
-        <p:txBody>
-          <a:bodyPr rtlCol="0" anchor="ctr"/>
-          <a:lstStyle/>
-          <a:p>
-            <a:pPr algn="ctr"/>
-            <a:r>
-              <a:rPr lang="en-US" dirty="0"/>
-              <a:t>Report Emotion on GUI</a:t>
             </a:r>
           </a:p>
         </p:txBody>

</xml_diff>